<commit_message>
On branch jg-docker-01 Your branch is ahead of 'origin/jg-docker-01' by 1 commit.   (use "git push" to publish your local commits)
Changes to be committed:
	modified:   network-analytics-final/powerpoint/Network Analysis - MLE Capstone Presentation_v07.pptx
</commit_message>
<xml_diff>
--- a/network-analytics-final/powerpoint/Network Analysis - MLE Capstone Presentation_v07.pptx
+++ b/network-analytics-final/powerpoint/Network Analysis - MLE Capstone Presentation_v07.pptx
@@ -347,7 +347,7 @@
       </p15:notesGuideLst>
     </p:ext>
     <p:ext uri="http://customooxmlschemas.google.com/">
-      <go:slidesCustomData xmlns="" xmlns:mc="http://schemas.openxmlformats.org/markup-compatibility/2006" xmlns:mv="urn:schemas-microsoft-com:mac:vml" xmlns:c="http://schemas.openxmlformats.org/drawingml/2006/chart" xmlns:dgm="http://schemas.openxmlformats.org/drawingml/2006/diagram" xmlns:o="urn:schemas-microsoft-com:office:office" xmlns:v="urn:schemas-microsoft-com:vml" xmlns:pvml="urn:schemas-microsoft-com:office:powerpoint" xmlns:com="http://schemas.openxmlformats.org/drawingml/2006/compatibility" xmlns:p14="http://schemas.microsoft.com/office/powerpoint/2010/main" xmlns:p15="http://schemas.microsoft.com/office/powerpoint/2012/main" xmlns:ahyp="http://schemas.microsoft.com/office/drawing/2018/hyperlinkcolor" xmlns:go="http://customooxmlschemas.google.com/" r:id="rId56" roundtripDataSignature="AMtx7miYcyAUIkQHKs4Ne0oM4jMUNFjmHA=="/>
+      <go:slidesCustomData xmlns:go="http://customooxmlschemas.google.com/" xmlns:ahyp="http://schemas.microsoft.com/office/drawing/2018/hyperlinkcolor" xmlns:p15="http://schemas.microsoft.com/office/powerpoint/2012/main" xmlns:p14="http://schemas.microsoft.com/office/powerpoint/2010/main" xmlns:com="http://schemas.openxmlformats.org/drawingml/2006/compatibility" xmlns:pvml="urn:schemas-microsoft-com:office:powerpoint" xmlns:v="urn:schemas-microsoft-com:vml" xmlns:o="urn:schemas-microsoft-com:office:office" xmlns:dgm="http://schemas.openxmlformats.org/drawingml/2006/diagram" xmlns:c="http://schemas.openxmlformats.org/drawingml/2006/chart" xmlns:mv="urn:schemas-microsoft-com:mac:vml" xmlns:mc="http://schemas.openxmlformats.org/markup-compatibility/2006" xmlns="" r:id="rId56" roundtripDataSignature="AMtx7miYcyAUIkQHKs4Ne0oM4jMUNFjmHA=="/>
     </p:ext>
   </p:extLst>
 </p:presentation>
@@ -13987,6 +13987,10 @@
           </p:nvPr>
         </p:nvSpPr>
         <p:spPr>
+          <a:xfrm>
+            <a:off x="304800" y="421350"/>
+            <a:ext cx="8520600" cy="572700"/>
+          </a:xfrm>
           <a:prstGeom prst="rect">
             <a:avLst/>
           </a:prstGeom>
@@ -26412,6 +26416,42 @@
           </a:p>
         </p:txBody>
       </p:sp>
+      <p:pic>
+        <p:nvPicPr>
+          <p:cNvPr id="2" name="Graphic 1">
+            <a:extLst>
+              <a:ext uri="{FF2B5EF4-FFF2-40B4-BE49-F238E27FC236}">
+                <a16:creationId xmlns:a16="http://schemas.microsoft.com/office/drawing/2014/main" id="{275887CF-1675-2A51-4966-0D330FC61F1E}"/>
+              </a:ext>
+            </a:extLst>
+          </p:cNvPr>
+          <p:cNvPicPr>
+            <a:picLocks noChangeAspect="1"/>
+          </p:cNvPicPr>
+          <p:nvPr/>
+        </p:nvPicPr>
+        <p:blipFill>
+          <a:blip r:embed="rId12">
+            <a:extLst>
+              <a:ext uri="{96DAC541-7B7A-43D3-8B79-37D633B846F1}">
+                <asvg:svgBlip xmlns:asvg="http://schemas.microsoft.com/office/drawing/2016/SVG/main" r:embed="rId13"/>
+              </a:ext>
+            </a:extLst>
+          </a:blip>
+          <a:stretch>
+            <a:fillRect/>
+          </a:stretch>
+        </p:blipFill>
+        <p:spPr>
+          <a:xfrm>
+            <a:off x="3040951" y="2936291"/>
+            <a:ext cx="530863" cy="489774"/>
+          </a:xfrm>
+          <a:prstGeom prst="rect">
+            <a:avLst/>
+          </a:prstGeom>
+        </p:spPr>
+      </p:pic>
     </p:spTree>
     <p:extLst>
       <p:ext uri="{BB962C8B-B14F-4D97-AF65-F5344CB8AC3E}">

</xml_diff>

<commit_message>
On branch jg-docker-01 Your branch is up to date with 'origin/jg-docker-01'.
Changes to be committed:
	modified:   network-analytics-final/powerpoint/Network Analysis - MLE Capstone Presentation_v07.pptx
</commit_message>
<xml_diff>
--- a/network-analytics-final/powerpoint/Network Analysis - MLE Capstone Presentation_v07.pptx
+++ b/network-analytics-final/powerpoint/Network Analysis - MLE Capstone Presentation_v07.pptx
@@ -13239,8 +13239,8 @@
         </p:nvSpPr>
         <p:spPr>
           <a:xfrm>
-            <a:off x="1504604" y="1554479"/>
-            <a:ext cx="5685905" cy="789709"/>
+            <a:off x="311700" y="1162050"/>
+            <a:ext cx="8527500" cy="3390899"/>
           </a:xfrm>
           <a:prstGeom prst="rect">
             <a:avLst/>
@@ -13264,7 +13264,96 @@
                   <a:schemeClr val="bg1"/>
                 </a:solidFill>
               </a:rPr>
-              <a:t>Include here a ’capture’ of what we will show in the demo, with a very brief description of the output and how it works.  </a:t>
+              <a:t>Include here a ’capture’ of what we will show in the demo, with a very brief description of the output and </a:t>
+            </a:r>
+            <a:r>
+              <a:rPr lang="en-US" dirty="0">
+                <a:solidFill>
+                  <a:srgbClr val="0070C0"/>
+                </a:solidFill>
+              </a:rPr>
+              <a:t>The demo we have deployed, tries to replicates the end user’s experience with our application.</a:t>
+            </a:r>
+          </a:p>
+          <a:p>
+            <a:endParaRPr lang="en-US" dirty="0">
+              <a:solidFill>
+                <a:srgbClr val="0070C0"/>
+              </a:solidFill>
+            </a:endParaRPr>
+          </a:p>
+          <a:p>
+            <a:r>
+              <a:rPr lang="en-US" dirty="0">
+                <a:solidFill>
+                  <a:srgbClr val="0070C0"/>
+                </a:solidFill>
+              </a:rPr>
+              <a:t>The client receives an alert that a network attack is on-going:</a:t>
+            </a:r>
+          </a:p>
+          <a:p>
+            <a:pPr marL="285750" lvl="2" indent="-285750">
+              <a:buFont typeface="Courier New" panose="02070309020205020404" pitchFamily="49" charset="0"/>
+              <a:buChar char="o"/>
+            </a:pPr>
+            <a:r>
+              <a:rPr lang="en-US" dirty="0">
+                <a:solidFill>
+                  <a:srgbClr val="0070C0"/>
+                </a:solidFill>
+              </a:rPr>
+              <a:t>Email to network engineers / network administrators,</a:t>
+            </a:r>
+          </a:p>
+          <a:p>
+            <a:pPr marL="285750" lvl="2" indent="-285750">
+              <a:buFont typeface="Courier New" panose="02070309020205020404" pitchFamily="49" charset="0"/>
+              <a:buChar char="o"/>
+            </a:pPr>
+            <a:r>
+              <a:rPr lang="en-US" dirty="0">
+                <a:solidFill>
+                  <a:srgbClr val="0070C0"/>
+                </a:solidFill>
+              </a:rPr>
+              <a:t>Alert on a dashboard and, potentially</a:t>
+            </a:r>
+          </a:p>
+          <a:p>
+            <a:pPr marL="285750" lvl="2" indent="-285750">
+              <a:buFont typeface="Courier New" panose="02070309020205020404" pitchFamily="49" charset="0"/>
+              <a:buChar char="o"/>
+            </a:pPr>
+            <a:r>
+              <a:rPr lang="en-US" dirty="0">
+                <a:solidFill>
+                  <a:srgbClr val="0070C0"/>
+                </a:solidFill>
+              </a:rPr>
+              <a:t>Some automated measures to reduce impact of attack.</a:t>
+            </a:r>
+          </a:p>
+          <a:p>
+            <a:pPr marL="285750" lvl="2" indent="-285750">
+              <a:buFont typeface="Courier New" panose="02070309020205020404" pitchFamily="49" charset="0"/>
+              <a:buChar char="o"/>
+            </a:pPr>
+            <a:endParaRPr lang="en-US" dirty="0">
+              <a:solidFill>
+                <a:srgbClr val="0070C0"/>
+              </a:solidFill>
+            </a:endParaRPr>
+          </a:p>
+          <a:p>
+            <a:pPr lvl="2"/>
+            <a:r>
+              <a:rPr lang="en-US" dirty="0">
+                <a:solidFill>
+                  <a:srgbClr val="0070C0"/>
+                </a:solidFill>
+              </a:rPr>
+              <a:t>The client not only receives the alert, but also a description of the type of attack.</a:t>
             </a:r>
           </a:p>
         </p:txBody>
@@ -13358,8 +13447,8 @@
         </p:nvSpPr>
         <p:spPr>
           <a:xfrm>
-            <a:off x="311700" y="1152475"/>
-            <a:ext cx="8520600" cy="3416400"/>
+            <a:off x="311700" y="1162049"/>
+            <a:ext cx="8520600" cy="3390901"/>
           </a:xfrm>
           <a:prstGeom prst="rect">
             <a:avLst/>
@@ -13421,7 +13510,7 @@
                 <a:latin typeface="Arial" panose="020B0604020202020204" pitchFamily="34" charset="0"/>
                 <a:cs typeface="Arial" panose="020B0604020202020204" pitchFamily="34" charset="0"/>
               </a:rPr>
-              <a:t>, Databricks environment,</a:t>
+              <a:t>, Databricks environment.</a:t>
             </a:r>
           </a:p>
           <a:p>
@@ -13445,6 +13534,39 @@
                 <a:cs typeface="Arial" panose="020B0604020202020204" pitchFamily="34" charset="0"/>
               </a:rPr>
               <a:t>Data drift analysis with a robust DevOps, CICD deployment.</a:t>
+            </a:r>
+          </a:p>
+          <a:p>
+            <a:pPr>
+              <a:buFont typeface="Arial" panose="020B0604020202020204" pitchFamily="34" charset="0"/>
+              <a:buChar char="•"/>
+            </a:pPr>
+            <a:endParaRPr lang="en-US" sz="1400" dirty="0">
+              <a:latin typeface="Arial" panose="020B0604020202020204" pitchFamily="34" charset="0"/>
+              <a:cs typeface="Arial" panose="020B0604020202020204" pitchFamily="34" charset="0"/>
+            </a:endParaRPr>
+          </a:p>
+          <a:p>
+            <a:pPr>
+              <a:buFont typeface="Arial" panose="020B0604020202020204" pitchFamily="34" charset="0"/>
+              <a:buChar char="•"/>
+            </a:pPr>
+            <a:endParaRPr lang="en-US" sz="1400" dirty="0">
+              <a:latin typeface="Arial" panose="020B0604020202020204" pitchFamily="34" charset="0"/>
+              <a:cs typeface="Arial" panose="020B0604020202020204" pitchFamily="34" charset="0"/>
+            </a:endParaRPr>
+          </a:p>
+          <a:p>
+            <a:pPr>
+              <a:buFont typeface="Arial" panose="020B0604020202020204" pitchFamily="34" charset="0"/>
+              <a:buChar char="•"/>
+            </a:pPr>
+            <a:r>
+              <a:rPr lang="en-US" sz="1400" dirty="0">
+                <a:latin typeface="Arial" panose="020B0604020202020204" pitchFamily="34" charset="0"/>
+                <a:cs typeface="Arial" panose="020B0604020202020204" pitchFamily="34" charset="0"/>
+              </a:rPr>
+              <a:t>Compare further the running cost of one-step classification vs two-step classification.</a:t>
             </a:r>
           </a:p>
           <a:p>
@@ -13548,18 +13670,41 @@
           <a:lstStyle/>
           <a:p>
             <a:r>
-              <a:rPr lang="en-US" sz="3200" dirty="0"/>
+              <a:rPr lang="en-US" sz="3200" dirty="0">
+                <a:solidFill>
+                  <a:srgbClr val="0070C0"/>
+                </a:solidFill>
+              </a:rPr>
               <a:t>Thank You! </a:t>
             </a:r>
             <a:br>
-              <a:rPr lang="en-US" sz="3200" dirty="0"/>
+              <a:rPr lang="en-US" sz="3200" dirty="0">
+                <a:solidFill>
+                  <a:srgbClr val="0070C0"/>
+                </a:solidFill>
+              </a:rPr>
             </a:br>
-            <a:r>
-              <a:rPr lang="en-US" sz="3200" dirty="0"/>
-              <a:t>Any Questions?</a:t>
-            </a:r>
             <a:br>
-              <a:rPr lang="en-US" sz="3200" dirty="0"/>
+              <a:rPr lang="en-US" sz="3200" dirty="0">
+                <a:solidFill>
+                  <a:srgbClr val="0070C0"/>
+                </a:solidFill>
+              </a:rPr>
+            </a:br>
+            <a:r>
+              <a:rPr lang="en-US" sz="3200" dirty="0">
+                <a:solidFill>
+                  <a:srgbClr val="0070C0"/>
+                </a:solidFill>
+              </a:rPr>
+              <a:t>We are now looking forward to your Questions</a:t>
+            </a:r>
+            <a:br>
+              <a:rPr lang="en-US" sz="3200" dirty="0">
+                <a:solidFill>
+                  <a:srgbClr val="0070C0"/>
+                </a:solidFill>
+              </a:rPr>
             </a:br>
             <a:br>
               <a:rPr lang="en-US" sz="1800" dirty="0"/>
@@ -13579,9 +13724,6 @@
             </a:r>
             <a:r>
               <a:rPr lang="en-US" sz="1800" dirty="0" err="1">
-                <a:highlight>
-                  <a:srgbClr val="FFFF00"/>
-                </a:highlight>
                 <a:latin typeface="Arial" panose="020B0604020202020204" pitchFamily="34" charset="0"/>
                 <a:cs typeface="Arial" panose="020B0604020202020204" pitchFamily="34" charset="0"/>
               </a:rPr>
@@ -13589,9 +13731,6 @@
             </a:r>
             <a:r>
               <a:rPr lang="en-US" sz="1800" dirty="0">
-                <a:highlight>
-                  <a:srgbClr val="FFFF00"/>
-                </a:highlight>
                 <a:latin typeface="Arial" panose="020B0604020202020204" pitchFamily="34" charset="0"/>
                 <a:cs typeface="Arial" panose="020B0604020202020204" pitchFamily="34" charset="0"/>
               </a:rPr>
@@ -13599,9 +13738,6 @@
             </a:r>
             <a:r>
               <a:rPr lang="en-US" sz="1800" dirty="0" err="1">
-                <a:highlight>
-                  <a:srgbClr val="FFFF00"/>
-                </a:highlight>
                 <a:latin typeface="Arial" panose="020B0604020202020204" pitchFamily="34" charset="0"/>
                 <a:cs typeface="Arial" panose="020B0604020202020204" pitchFamily="34" charset="0"/>
               </a:rPr>
@@ -13609,9 +13745,6 @@
             </a:r>
             <a:r>
               <a:rPr lang="en-US" sz="1800" dirty="0">
-                <a:highlight>
-                  <a:srgbClr val="FFFF00"/>
-                </a:highlight>
                 <a:latin typeface="Arial" panose="020B0604020202020204" pitchFamily="34" charset="0"/>
                 <a:cs typeface="Arial" panose="020B0604020202020204" pitchFamily="34" charset="0"/>
               </a:rPr>
@@ -13619,9 +13752,6 @@
             </a:r>
             <a:r>
               <a:rPr lang="en-US" sz="1800" dirty="0" err="1">
-                <a:highlight>
-                  <a:srgbClr val="FFFF00"/>
-                </a:highlight>
                 <a:latin typeface="Arial" panose="020B0604020202020204" pitchFamily="34" charset="0"/>
                 <a:cs typeface="Arial" panose="020B0604020202020204" pitchFamily="34" charset="0"/>
               </a:rPr>
@@ -13629,9 +13759,6 @@
             </a:r>
             <a:r>
               <a:rPr lang="en-US" sz="1800" dirty="0">
-                <a:highlight>
-                  <a:srgbClr val="FFFF00"/>
-                </a:highlight>
                 <a:latin typeface="Arial" panose="020B0604020202020204" pitchFamily="34" charset="0"/>
                 <a:cs typeface="Arial" panose="020B0604020202020204" pitchFamily="34" charset="0"/>
               </a:rPr>
@@ -13639,28 +13766,18 @@
             </a:r>
             <a:br>
               <a:rPr lang="en-US" sz="1800" dirty="0">
-                <a:highlight>
-                  <a:srgbClr val="FFFF00"/>
-                </a:highlight>
                 <a:latin typeface="Arial" panose="020B0604020202020204" pitchFamily="34" charset="0"/>
                 <a:cs typeface="Arial" panose="020B0604020202020204" pitchFamily="34" charset="0"/>
               </a:rPr>
             </a:br>
             <a:r>
               <a:rPr lang="en-US" sz="1800" dirty="0">
-                <a:highlight>
-                  <a:srgbClr val="FFFF00"/>
-                </a:highlight>
                 <a:latin typeface="Arial" panose="020B0604020202020204" pitchFamily="34" charset="0"/>
                 <a:cs typeface="Arial" panose="020B0604020202020204" pitchFamily="34" charset="0"/>
               </a:rPr>
               <a:t>[Demo: link to demo]</a:t>
             </a:r>
-            <a:endParaRPr dirty="0">
-              <a:highlight>
-                <a:srgbClr val="FFFF00"/>
-              </a:highlight>
-            </a:endParaRPr>
+            <a:endParaRPr dirty="0"/>
           </a:p>
         </p:txBody>
       </p:sp>
@@ -15583,6 +15700,10 @@
           </p:nvPr>
         </p:nvSpPr>
         <p:spPr>
+          <a:xfrm>
+            <a:off x="311700" y="1162049"/>
+            <a:ext cx="8520600" cy="3390901"/>
+          </a:xfrm>
           <a:prstGeom prst="rect">
             <a:avLst/>
           </a:prstGeom>
@@ -15751,41 +15872,6 @@
                 <a:cs typeface="Arial" panose="020B0604020202020204" pitchFamily="34" charset="0"/>
               </a:rPr>
               <a:t>Demo</a:t>
-            </a:r>
-          </a:p>
-          <a:p>
-            <a:pPr>
-              <a:lnSpc>
-                <a:spcPct val="100000"/>
-              </a:lnSpc>
-              <a:buFont typeface="Arial" panose="020B0604020202020204" pitchFamily="34" charset="0"/>
-              <a:buChar char="•"/>
-            </a:pPr>
-            <a:endParaRPr sz="1600" dirty="0">
-              <a:solidFill>
-                <a:schemeClr val="bg2"/>
-              </a:solidFill>
-              <a:latin typeface="Arial" panose="020B0604020202020204" pitchFamily="34" charset="0"/>
-              <a:cs typeface="Arial" panose="020B0604020202020204" pitchFamily="34" charset="0"/>
-            </a:endParaRPr>
-          </a:p>
-          <a:p>
-            <a:pPr>
-              <a:lnSpc>
-                <a:spcPct val="100000"/>
-              </a:lnSpc>
-              <a:buFont typeface="Arial" panose="020B0604020202020204" pitchFamily="34" charset="0"/>
-              <a:buChar char="•"/>
-            </a:pPr>
-            <a:r>
-              <a:rPr lang="en-US" sz="1600" dirty="0">
-                <a:solidFill>
-                  <a:schemeClr val="bg2"/>
-                </a:solidFill>
-                <a:latin typeface="Arial" panose="020B0604020202020204" pitchFamily="34" charset="0"/>
-                <a:cs typeface="Arial" panose="020B0604020202020204" pitchFamily="34" charset="0"/>
-              </a:rPr>
-              <a:t>Conclusions (and lessons learned)</a:t>
             </a:r>
           </a:p>
           <a:p>
@@ -20047,7 +20133,9 @@
             <a:r>
               <a:rPr lang="en-US" sz="1400" dirty="0">
                 <a:solidFill>
-                  <a:schemeClr val="bg1"/>
+                  <a:schemeClr val="tx2">
+                    <a:lumMod val="10000"/>
+                  </a:schemeClr>
                 </a:solidFill>
                 <a:latin typeface="Arial" panose="020B0604020202020204" pitchFamily="34" charset="0"/>
                 <a:cs typeface="Arial" panose="020B0604020202020204" pitchFamily="34" charset="0"/>
@@ -20057,7 +20145,9 @@
             <a:r>
               <a:rPr lang="en-US" sz="1400" dirty="0" err="1">
                 <a:solidFill>
-                  <a:schemeClr val="bg1"/>
+                  <a:schemeClr val="tx2">
+                    <a:lumMod val="10000"/>
+                  </a:schemeClr>
                 </a:solidFill>
                 <a:latin typeface="Arial" panose="020B0604020202020204" pitchFamily="34" charset="0"/>
                 <a:cs typeface="Arial" panose="020B0604020202020204" pitchFamily="34" charset="0"/>
@@ -20067,7 +20157,9 @@
             <a:r>
               <a:rPr lang="en-US" sz="1400" dirty="0">
                 <a:solidFill>
-                  <a:schemeClr val="bg1"/>
+                  <a:schemeClr val="tx2">
+                    <a:lumMod val="10000"/>
+                  </a:schemeClr>
                 </a:solidFill>
                 <a:latin typeface="Arial" panose="020B0604020202020204" pitchFamily="34" charset="0"/>
                 <a:cs typeface="Arial" panose="020B0604020202020204" pitchFamily="34" charset="0"/>
@@ -20076,7 +20168,9 @@
             </a:r>
             <a:endParaRPr sz="1400" dirty="0">
               <a:solidFill>
-                <a:schemeClr val="bg1"/>
+                <a:schemeClr val="tx2">
+                  <a:lumMod val="10000"/>
+                </a:schemeClr>
               </a:solidFill>
               <a:latin typeface="Arial" panose="020B0604020202020204" pitchFamily="34" charset="0"/>
               <a:cs typeface="Arial" panose="020B0604020202020204" pitchFamily="34" charset="0"/>

</xml_diff>